<commit_message>
befejeztem a ppt :>
</commit_message>
<xml_diff>
--- a/Japán technológia.pptx
+++ b/Japán technológia.pptx
@@ -10,6 +10,8 @@
     <p:sldId id="261" r:id="rId4"/>
     <p:sldId id="262" r:id="rId5"/>
     <p:sldId id="263" r:id="rId6"/>
+    <p:sldId id="264" r:id="rId7"/>
+    <p:sldId id="265" r:id="rId8"/>
   </p:sldIdLst>
   <p:sldSz cx="12192000" cy="6858000"/>
   <p:notesSz cx="6858000" cy="9144000"/>
@@ -238,7 +240,7 @@
           </a:lstStyle>
           <a:p>
             <a:r>
-              <a:rPr lang="hu-HU" smtClean="0"/>
+              <a:rPr lang="hu-HU"/>
               <a:t>Mintacím szerkesztése</a:t>
             </a:r>
             <a:endParaRPr lang="en-US" dirty="0"/>
@@ -309,7 +311,7 @@
           </a:lstStyle>
           <a:p>
             <a:r>
-              <a:rPr lang="hu-HU" smtClean="0"/>
+              <a:rPr lang="hu-HU"/>
               <a:t>Kattintson ide az alcím mintájának szerkesztéséhez</a:t>
             </a:r>
             <a:endParaRPr lang="en-US" dirty="0"/>
@@ -333,7 +335,7 @@
           <a:p>
             <a:fld id="{7F46E5F8-1B34-4EE5-A95A-9B2AAC9135C0}" type="datetimeFigureOut">
               <a:rPr lang="hu-HU" smtClean="0"/>
-              <a:t>2022.09.19.</a:t>
+              <a:t>2022. 09. 27.</a:t>
             </a:fld>
             <a:endParaRPr lang="hu-HU"/>
           </a:p>
@@ -592,7 +594,7 @@
           <a:lstStyle/>
           <a:p>
             <a:r>
-              <a:rPr lang="hu-HU" smtClean="0"/>
+              <a:rPr lang="hu-HU"/>
               <a:t>Mintacím szerkesztése</a:t>
             </a:r>
             <a:endParaRPr lang="en-US" dirty="0"/>
@@ -616,35 +618,35 @@
           <a:p>
             <a:pPr lvl="0"/>
             <a:r>
-              <a:rPr lang="hu-HU" smtClean="0"/>
+              <a:rPr lang="hu-HU"/>
               <a:t>Mintaszöveg szerkesztése</a:t>
             </a:r>
           </a:p>
           <a:p>
             <a:pPr lvl="1"/>
             <a:r>
-              <a:rPr lang="hu-HU" smtClean="0"/>
+              <a:rPr lang="hu-HU"/>
               <a:t>Második szint</a:t>
             </a:r>
           </a:p>
           <a:p>
             <a:pPr lvl="2"/>
             <a:r>
-              <a:rPr lang="hu-HU" smtClean="0"/>
+              <a:rPr lang="hu-HU"/>
               <a:t>Harmadik szint</a:t>
             </a:r>
           </a:p>
           <a:p>
             <a:pPr lvl="3"/>
             <a:r>
-              <a:rPr lang="hu-HU" smtClean="0"/>
+              <a:rPr lang="hu-HU"/>
               <a:t>Negyedik szint</a:t>
             </a:r>
           </a:p>
           <a:p>
             <a:pPr lvl="4"/>
             <a:r>
-              <a:rPr lang="hu-HU" smtClean="0"/>
+              <a:rPr lang="hu-HU"/>
               <a:t>Ötödik szint</a:t>
             </a:r>
             <a:endParaRPr lang="en-US" dirty="0"/>
@@ -668,7 +670,7 @@
           <a:p>
             <a:fld id="{7F46E5F8-1B34-4EE5-A95A-9B2AAC9135C0}" type="datetimeFigureOut">
               <a:rPr lang="hu-HU" smtClean="0"/>
-              <a:t>2022.09.19.</a:t>
+              <a:t>2022. 09. 27.</a:t>
             </a:fld>
             <a:endParaRPr lang="hu-HU"/>
           </a:p>
@@ -890,7 +892,7 @@
           </a:lstStyle>
           <a:p>
             <a:r>
-              <a:rPr lang="hu-HU" smtClean="0"/>
+              <a:rPr lang="hu-HU"/>
               <a:t>Mintacím szerkesztése</a:t>
             </a:r>
             <a:endParaRPr lang="en-US" dirty="0"/>
@@ -919,35 +921,35 @@
           <a:p>
             <a:pPr lvl="0"/>
             <a:r>
-              <a:rPr lang="hu-HU" smtClean="0"/>
+              <a:rPr lang="hu-HU"/>
               <a:t>Mintaszöveg szerkesztése</a:t>
             </a:r>
           </a:p>
           <a:p>
             <a:pPr lvl="1"/>
             <a:r>
-              <a:rPr lang="hu-HU" smtClean="0"/>
+              <a:rPr lang="hu-HU"/>
               <a:t>Második szint</a:t>
             </a:r>
           </a:p>
           <a:p>
             <a:pPr lvl="2"/>
             <a:r>
-              <a:rPr lang="hu-HU" smtClean="0"/>
+              <a:rPr lang="hu-HU"/>
               <a:t>Harmadik szint</a:t>
             </a:r>
           </a:p>
           <a:p>
             <a:pPr lvl="3"/>
             <a:r>
-              <a:rPr lang="hu-HU" smtClean="0"/>
+              <a:rPr lang="hu-HU"/>
               <a:t>Negyedik szint</a:t>
             </a:r>
           </a:p>
           <a:p>
             <a:pPr lvl="4"/>
             <a:r>
-              <a:rPr lang="hu-HU" smtClean="0"/>
+              <a:rPr lang="hu-HU"/>
               <a:t>Ötödik szint</a:t>
             </a:r>
             <a:endParaRPr lang="en-US" dirty="0"/>
@@ -971,7 +973,7 @@
           <a:p>
             <a:fld id="{7F46E5F8-1B34-4EE5-A95A-9B2AAC9135C0}" type="datetimeFigureOut">
               <a:rPr lang="hu-HU" smtClean="0"/>
-              <a:t>2022.09.19.</a:t>
+              <a:t>2022. 09. 27.</a:t>
             </a:fld>
             <a:endParaRPr lang="hu-HU"/>
           </a:p>
@@ -1143,7 +1145,7 @@
           <a:lstStyle/>
           <a:p>
             <a:r>
-              <a:rPr lang="hu-HU" smtClean="0"/>
+              <a:rPr lang="hu-HU"/>
               <a:t>Mintacím szerkesztése</a:t>
             </a:r>
             <a:endParaRPr lang="en-US" dirty="0"/>
@@ -1167,35 +1169,35 @@
           <a:p>
             <a:pPr lvl="0"/>
             <a:r>
-              <a:rPr lang="hu-HU" smtClean="0"/>
+              <a:rPr lang="hu-HU"/>
               <a:t>Mintaszöveg szerkesztése</a:t>
             </a:r>
           </a:p>
           <a:p>
             <a:pPr lvl="1"/>
             <a:r>
-              <a:rPr lang="hu-HU" smtClean="0"/>
+              <a:rPr lang="hu-HU"/>
               <a:t>Második szint</a:t>
             </a:r>
           </a:p>
           <a:p>
             <a:pPr lvl="2"/>
             <a:r>
-              <a:rPr lang="hu-HU" smtClean="0"/>
+              <a:rPr lang="hu-HU"/>
               <a:t>Harmadik szint</a:t>
             </a:r>
           </a:p>
           <a:p>
             <a:pPr lvl="3"/>
             <a:r>
-              <a:rPr lang="hu-HU" smtClean="0"/>
+              <a:rPr lang="hu-HU"/>
               <a:t>Negyedik szint</a:t>
             </a:r>
           </a:p>
           <a:p>
             <a:pPr lvl="4"/>
             <a:r>
-              <a:rPr lang="hu-HU" smtClean="0"/>
+              <a:rPr lang="hu-HU"/>
               <a:t>Ötödik szint</a:t>
             </a:r>
             <a:endParaRPr lang="en-US" dirty="0"/>
@@ -1219,7 +1221,7 @@
           <a:p>
             <a:fld id="{7F46E5F8-1B34-4EE5-A95A-9B2AAC9135C0}" type="datetimeFigureOut">
               <a:rPr lang="hu-HU" smtClean="0"/>
-              <a:t>2022.09.19.</a:t>
+              <a:t>2022. 09. 27.</a:t>
             </a:fld>
             <a:endParaRPr lang="hu-HU"/>
           </a:p>
@@ -1484,7 +1486,7 @@
           </a:lstStyle>
           <a:p>
             <a:r>
-              <a:rPr lang="hu-HU" smtClean="0"/>
+              <a:rPr lang="hu-HU"/>
               <a:t>Mintacím szerkesztése</a:t>
             </a:r>
             <a:endParaRPr lang="en-US" dirty="0"/>
@@ -1604,7 +1606,7 @@
           <a:p>
             <a:pPr lvl="0"/>
             <a:r>
-              <a:rPr lang="hu-HU" smtClean="0"/>
+              <a:rPr lang="hu-HU"/>
               <a:t>Mintaszöveg szerkesztése</a:t>
             </a:r>
           </a:p>
@@ -1627,7 +1629,7 @@
           <a:p>
             <a:fld id="{7F46E5F8-1B34-4EE5-A95A-9B2AAC9135C0}" type="datetimeFigureOut">
               <a:rPr lang="hu-HU" smtClean="0"/>
-              <a:t>2022.09.19.</a:t>
+              <a:t>2022. 09. 27.</a:t>
             </a:fld>
             <a:endParaRPr lang="hu-HU"/>
           </a:p>
@@ -1804,7 +1806,7 @@
           <a:lstStyle/>
           <a:p>
             <a:r>
-              <a:rPr lang="hu-HU" smtClean="0"/>
+              <a:rPr lang="hu-HU"/>
               <a:t>Mintacím szerkesztése</a:t>
             </a:r>
             <a:endParaRPr lang="en-US" dirty="0"/>
@@ -1833,35 +1835,35 @@
           <a:p>
             <a:pPr lvl="0"/>
             <a:r>
-              <a:rPr lang="hu-HU" smtClean="0"/>
+              <a:rPr lang="hu-HU"/>
               <a:t>Mintaszöveg szerkesztése</a:t>
             </a:r>
           </a:p>
           <a:p>
             <a:pPr lvl="1"/>
             <a:r>
-              <a:rPr lang="hu-HU" smtClean="0"/>
+              <a:rPr lang="hu-HU"/>
               <a:t>Második szint</a:t>
             </a:r>
           </a:p>
           <a:p>
             <a:pPr lvl="2"/>
             <a:r>
-              <a:rPr lang="hu-HU" smtClean="0"/>
+              <a:rPr lang="hu-HU"/>
               <a:t>Harmadik szint</a:t>
             </a:r>
           </a:p>
           <a:p>
             <a:pPr lvl="3"/>
             <a:r>
-              <a:rPr lang="hu-HU" smtClean="0"/>
+              <a:rPr lang="hu-HU"/>
               <a:t>Negyedik szint</a:t>
             </a:r>
           </a:p>
           <a:p>
             <a:pPr lvl="4"/>
             <a:r>
-              <a:rPr lang="hu-HU" smtClean="0"/>
+              <a:rPr lang="hu-HU"/>
               <a:t>Ötödik szint</a:t>
             </a:r>
             <a:endParaRPr lang="en-US" dirty="0"/>
@@ -1890,35 +1892,35 @@
           <a:p>
             <a:pPr lvl="0"/>
             <a:r>
-              <a:rPr lang="hu-HU" smtClean="0"/>
+              <a:rPr lang="hu-HU"/>
               <a:t>Mintaszöveg szerkesztése</a:t>
             </a:r>
           </a:p>
           <a:p>
             <a:pPr lvl="1"/>
             <a:r>
-              <a:rPr lang="hu-HU" smtClean="0"/>
+              <a:rPr lang="hu-HU"/>
               <a:t>Második szint</a:t>
             </a:r>
           </a:p>
           <a:p>
             <a:pPr lvl="2"/>
             <a:r>
-              <a:rPr lang="hu-HU" smtClean="0"/>
+              <a:rPr lang="hu-HU"/>
               <a:t>Harmadik szint</a:t>
             </a:r>
           </a:p>
           <a:p>
             <a:pPr lvl="3"/>
             <a:r>
-              <a:rPr lang="hu-HU" smtClean="0"/>
+              <a:rPr lang="hu-HU"/>
               <a:t>Negyedik szint</a:t>
             </a:r>
           </a:p>
           <a:p>
             <a:pPr lvl="4"/>
             <a:r>
-              <a:rPr lang="hu-HU" smtClean="0"/>
+              <a:rPr lang="hu-HU"/>
               <a:t>Ötödik szint</a:t>
             </a:r>
             <a:endParaRPr lang="en-US" dirty="0"/>
@@ -1942,7 +1944,7 @@
           <a:p>
             <a:fld id="{7F46E5F8-1B34-4EE5-A95A-9B2AAC9135C0}" type="datetimeFigureOut">
               <a:rPr lang="hu-HU" smtClean="0"/>
-              <a:t>2022.09.19.</a:t>
+              <a:t>2022. 09. 27.</a:t>
             </a:fld>
             <a:endParaRPr lang="hu-HU"/>
           </a:p>
@@ -2201,7 +2203,7 @@
           <a:lstStyle/>
           <a:p>
             <a:r>
-              <a:rPr lang="hu-HU" smtClean="0"/>
+              <a:rPr lang="hu-HU"/>
               <a:t>Mintacím szerkesztése</a:t>
             </a:r>
             <a:endParaRPr lang="en-US" dirty="0"/>
@@ -2276,7 +2278,7 @@
           <a:p>
             <a:pPr lvl="0"/>
             <a:r>
-              <a:rPr lang="hu-HU" smtClean="0"/>
+              <a:rPr lang="hu-HU"/>
               <a:t>Mintaszöveg szerkesztése</a:t>
             </a:r>
           </a:p>
@@ -2304,35 +2306,35 @@
           <a:p>
             <a:pPr lvl="0"/>
             <a:r>
-              <a:rPr lang="hu-HU" smtClean="0"/>
+              <a:rPr lang="hu-HU"/>
               <a:t>Mintaszöveg szerkesztése</a:t>
             </a:r>
           </a:p>
           <a:p>
             <a:pPr lvl="1"/>
             <a:r>
-              <a:rPr lang="hu-HU" smtClean="0"/>
+              <a:rPr lang="hu-HU"/>
               <a:t>Második szint</a:t>
             </a:r>
           </a:p>
           <a:p>
             <a:pPr lvl="2"/>
             <a:r>
-              <a:rPr lang="hu-HU" smtClean="0"/>
+              <a:rPr lang="hu-HU"/>
               <a:t>Harmadik szint</a:t>
             </a:r>
           </a:p>
           <a:p>
             <a:pPr lvl="3"/>
             <a:r>
-              <a:rPr lang="hu-HU" smtClean="0"/>
+              <a:rPr lang="hu-HU"/>
               <a:t>Negyedik szint</a:t>
             </a:r>
           </a:p>
           <a:p>
             <a:pPr lvl="4"/>
             <a:r>
-              <a:rPr lang="hu-HU" smtClean="0"/>
+              <a:rPr lang="hu-HU"/>
               <a:t>Ötödik szint</a:t>
             </a:r>
             <a:endParaRPr lang="en-US" dirty="0"/>
@@ -2407,7 +2409,7 @@
           <a:p>
             <a:pPr lvl="0"/>
             <a:r>
-              <a:rPr lang="hu-HU" smtClean="0"/>
+              <a:rPr lang="hu-HU"/>
               <a:t>Mintaszöveg szerkesztése</a:t>
             </a:r>
           </a:p>
@@ -2435,35 +2437,35 @@
           <a:p>
             <a:pPr lvl="0"/>
             <a:r>
-              <a:rPr lang="hu-HU" smtClean="0"/>
+              <a:rPr lang="hu-HU"/>
               <a:t>Mintaszöveg szerkesztése</a:t>
             </a:r>
           </a:p>
           <a:p>
             <a:pPr lvl="1"/>
             <a:r>
-              <a:rPr lang="hu-HU" smtClean="0"/>
+              <a:rPr lang="hu-HU"/>
               <a:t>Második szint</a:t>
             </a:r>
           </a:p>
           <a:p>
             <a:pPr lvl="2"/>
             <a:r>
-              <a:rPr lang="hu-HU" smtClean="0"/>
+              <a:rPr lang="hu-HU"/>
               <a:t>Harmadik szint</a:t>
             </a:r>
           </a:p>
           <a:p>
             <a:pPr lvl="3"/>
             <a:r>
-              <a:rPr lang="hu-HU" smtClean="0"/>
+              <a:rPr lang="hu-HU"/>
               <a:t>Negyedik szint</a:t>
             </a:r>
           </a:p>
           <a:p>
             <a:pPr lvl="4"/>
             <a:r>
-              <a:rPr lang="hu-HU" smtClean="0"/>
+              <a:rPr lang="hu-HU"/>
               <a:t>Ötödik szint</a:t>
             </a:r>
             <a:endParaRPr lang="en-US" dirty="0"/>
@@ -2487,7 +2489,7 @@
           <a:p>
             <a:fld id="{7F46E5F8-1B34-4EE5-A95A-9B2AAC9135C0}" type="datetimeFigureOut">
               <a:rPr lang="hu-HU" smtClean="0"/>
-              <a:t>2022.09.19.</a:t>
+              <a:t>2022. 09. 27.</a:t>
             </a:fld>
             <a:endParaRPr lang="hu-HU"/>
           </a:p>
@@ -2659,7 +2661,7 @@
           <a:lstStyle/>
           <a:p>
             <a:r>
-              <a:rPr lang="hu-HU" smtClean="0"/>
+              <a:rPr lang="hu-HU"/>
               <a:t>Mintacím szerkesztése</a:t>
             </a:r>
             <a:endParaRPr lang="en-US" dirty="0"/>
@@ -2683,7 +2685,7 @@
           <a:p>
             <a:fld id="{7F46E5F8-1B34-4EE5-A95A-9B2AAC9135C0}" type="datetimeFigureOut">
               <a:rPr lang="hu-HU" smtClean="0"/>
-              <a:t>2022.09.19.</a:t>
+              <a:t>2022. 09. 27.</a:t>
             </a:fld>
             <a:endParaRPr lang="hu-HU"/>
           </a:p>
@@ -2897,7 +2899,7 @@
           <a:p>
             <a:fld id="{7F46E5F8-1B34-4EE5-A95A-9B2AAC9135C0}" type="datetimeFigureOut">
               <a:rPr lang="hu-HU" smtClean="0"/>
-              <a:t>2022.09.19.</a:t>
+              <a:t>2022. 09. 27.</a:t>
             </a:fld>
             <a:endParaRPr lang="hu-HU"/>
           </a:p>
@@ -3121,7 +3123,7 @@
           </a:lstStyle>
           <a:p>
             <a:r>
-              <a:rPr lang="hu-HU" smtClean="0"/>
+              <a:rPr lang="hu-HU"/>
               <a:t>Mintacím szerkesztése</a:t>
             </a:r>
             <a:endParaRPr lang="en-US" dirty="0"/>
@@ -3150,35 +3152,35 @@
           <a:p>
             <a:pPr lvl="0"/>
             <a:r>
-              <a:rPr lang="hu-HU" smtClean="0"/>
+              <a:rPr lang="hu-HU"/>
               <a:t>Mintaszöveg szerkesztése</a:t>
             </a:r>
           </a:p>
           <a:p>
             <a:pPr lvl="1"/>
             <a:r>
-              <a:rPr lang="hu-HU" smtClean="0"/>
+              <a:rPr lang="hu-HU"/>
               <a:t>Második szint</a:t>
             </a:r>
           </a:p>
           <a:p>
             <a:pPr lvl="2"/>
             <a:r>
-              <a:rPr lang="hu-HU" smtClean="0"/>
+              <a:rPr lang="hu-HU"/>
               <a:t>Harmadik szint</a:t>
             </a:r>
           </a:p>
           <a:p>
             <a:pPr lvl="3"/>
             <a:r>
-              <a:rPr lang="hu-HU" smtClean="0"/>
+              <a:rPr lang="hu-HU"/>
               <a:t>Negyedik szint</a:t>
             </a:r>
           </a:p>
           <a:p>
             <a:pPr lvl="4"/>
             <a:r>
-              <a:rPr lang="hu-HU" smtClean="0"/>
+              <a:rPr lang="hu-HU"/>
               <a:t>Ötödik szint</a:t>
             </a:r>
             <a:endParaRPr lang="en-US" dirty="0"/>
@@ -3244,7 +3246,7 @@
           <a:p>
             <a:pPr lvl="0"/>
             <a:r>
-              <a:rPr lang="hu-HU" smtClean="0"/>
+              <a:rPr lang="hu-HU"/>
               <a:t>Mintaszöveg szerkesztése</a:t>
             </a:r>
           </a:p>
@@ -3267,7 +3269,7 @@
           <a:p>
             <a:fld id="{7F46E5F8-1B34-4EE5-A95A-9B2AAC9135C0}" type="datetimeFigureOut">
               <a:rPr lang="hu-HU" smtClean="0"/>
-              <a:t>2022.09.19.</a:t>
+              <a:t>2022. 09. 27.</a:t>
             </a:fld>
             <a:endParaRPr lang="hu-HU"/>
           </a:p>
@@ -3505,7 +3507,7 @@
           </a:lstStyle>
           <a:p>
             <a:r>
-              <a:rPr lang="hu-HU" smtClean="0"/>
+              <a:rPr lang="hu-HU"/>
               <a:t>Kép beszúrásához kattintson az ikonra</a:t>
             </a:r>
             <a:endParaRPr lang="en-US" dirty="0"/>
@@ -3580,7 +3582,7 @@
           </a:lstStyle>
           <a:p>
             <a:r>
-              <a:rPr lang="hu-HU" smtClean="0"/>
+              <a:rPr lang="hu-HU"/>
               <a:t>Mintacím szerkesztése</a:t>
             </a:r>
             <a:endParaRPr lang="en-US" dirty="0"/>
@@ -3648,7 +3650,7 @@
           <a:p>
             <a:pPr lvl="0"/>
             <a:r>
-              <a:rPr lang="hu-HU" smtClean="0"/>
+              <a:rPr lang="hu-HU"/>
               <a:t>Mintaszöveg szerkesztése</a:t>
             </a:r>
           </a:p>
@@ -3671,7 +3673,7 @@
           <a:p>
             <a:fld id="{7F46E5F8-1B34-4EE5-A95A-9B2AAC9135C0}" type="datetimeFigureOut">
               <a:rPr lang="hu-HU" smtClean="0"/>
-              <a:t>2022.09.19.</a:t>
+              <a:t>2022. 09. 27.</a:t>
             </a:fld>
             <a:endParaRPr lang="hu-HU"/>
           </a:p>
@@ -3878,7 +3880,7 @@
           <a:lstStyle/>
           <a:p>
             <a:r>
-              <a:rPr lang="hu-HU" smtClean="0"/>
+              <a:rPr lang="hu-HU"/>
               <a:t>Mintacím szerkesztése</a:t>
             </a:r>
             <a:endParaRPr lang="en-US" dirty="0"/>
@@ -4010,7 +4012,7 @@
           <a:p>
             <a:fld id="{7F46E5F8-1B34-4EE5-A95A-9B2AAC9135C0}" type="datetimeFigureOut">
               <a:rPr lang="hu-HU" smtClean="0"/>
-              <a:t>2022.09.19.</a:t>
+              <a:t>2022. 09. 27.</a:t>
             </a:fld>
             <a:endParaRPr lang="hu-HU"/>
           </a:p>
@@ -4538,7 +4540,7 @@
         </p:nvSpPr>
         <p:spPr>
           <a:xfrm>
-            <a:off x="1990016" y="1734648"/>
+            <a:off x="2116834" y="2422711"/>
             <a:ext cx="7958331" cy="1077229"/>
           </a:xfrm>
         </p:spPr>
@@ -4550,14 +4552,11 @@
           <a:p>
             <a:pPr algn="ctr"/>
             <a:r>
-              <a:rPr lang="hu-HU" sz="7200" dirty="0" smtClean="0">
+              <a:rPr lang="hu-HU" sz="7200" dirty="0">
                 <a:latin typeface="Garamond" panose="02020404030301010803" pitchFamily="18" charset="0"/>
               </a:rPr>
               <a:t>Japán technológia</a:t>
             </a:r>
-            <a:endParaRPr lang="hu-HU" sz="7200" dirty="0">
-              <a:latin typeface="Garamond" panose="02020404030301010803" pitchFamily="18" charset="0"/>
-            </a:endParaRPr>
           </a:p>
         </p:txBody>
       </p:sp>
@@ -4571,13 +4570,6 @@
   <p:clrMapOvr>
     <a:masterClrMapping/>
   </p:clrMapOvr>
-  <p:timing>
-    <p:tnLst>
-      <p:par>
-        <p:cTn id="1" dur="indefinite" restart="never" nodeType="tmRoot"/>
-      </p:par>
-    </p:tnLst>
-  </p:timing>
 </p:sld>
 </file>
 
@@ -4610,8 +4602,8 @@
         </p:nvSpPr>
         <p:spPr>
           <a:xfrm>
-            <a:off x="2428928" y="795864"/>
-            <a:ext cx="7958331" cy="1077229"/>
+            <a:off x="1464985" y="895452"/>
+            <a:ext cx="4736640" cy="1077229"/>
           </a:xfrm>
         </p:spPr>
         <p:txBody>
@@ -4622,14 +4614,11 @@
           <a:p>
             <a:pPr algn="ctr"/>
             <a:r>
-              <a:rPr lang="hu-HU" sz="4000" dirty="0" smtClean="0">
+              <a:rPr lang="hu-HU" sz="4000" dirty="0">
                 <a:latin typeface="Georgia" panose="02040502050405020303" pitchFamily="18" charset="0"/>
               </a:rPr>
-              <a:t>Tudomány és technológia</a:t>
-            </a:r>
-            <a:endParaRPr lang="hu-HU" sz="4000" dirty="0">
-              <a:latin typeface="Georgia" panose="02040502050405020303" pitchFamily="18" charset="0"/>
-            </a:endParaRPr>
+              <a:t>Fejlődése</a:t>
+            </a:r>
           </a:p>
         </p:txBody>
       </p:sp>
@@ -4645,8 +4634,8 @@
         </p:nvSpPr>
         <p:spPr>
           <a:xfrm>
-            <a:off x="2176191" y="1873093"/>
-            <a:ext cx="7382337" cy="4324300"/>
+            <a:off x="2214709" y="2055137"/>
+            <a:ext cx="7382337" cy="3194282"/>
           </a:xfrm>
         </p:spPr>
         <p:txBody>
@@ -4656,7 +4645,7 @@
           <a:lstStyle/>
           <a:p>
             <a:r>
-              <a:rPr lang="hu-HU" sz="2400" dirty="0" smtClean="0">
+              <a:rPr lang="hu-HU" sz="2400" dirty="0">
                 <a:latin typeface="Bahnschrift SemiLight" panose="020B0502040204020203" pitchFamily="34" charset="0"/>
               </a:rPr>
               <a:t>Második világháború után</a:t>
@@ -4664,7 +4653,7 @@
           </a:p>
           <a:p>
             <a:r>
-              <a:rPr lang="hu-HU" sz="2400" dirty="0" smtClean="0">
+              <a:rPr lang="hu-HU" sz="2400" dirty="0">
                 <a:latin typeface="Bahnschrift SemiLight" panose="020B0502040204020203" pitchFamily="34" charset="0"/>
               </a:rPr>
               <a:t>Járműtechnika, fogyasztói elektronika,</a:t>
@@ -4672,14 +4661,11 @@
           </a:p>
           <a:p>
             <a:r>
-              <a:rPr lang="hu-HU" sz="2400" dirty="0" smtClean="0">
+              <a:rPr lang="hu-HU" sz="2400" dirty="0">
                 <a:latin typeface="Bahnschrift SemiLight" panose="020B0502040204020203" pitchFamily="34" charset="0"/>
               </a:rPr>
-              <a:t> Robotika és orvosi eszközök, űrkutatás</a:t>
-            </a:r>
-            <a:endParaRPr lang="hu-HU" sz="2400" dirty="0">
-              <a:latin typeface="Bahnschrift SemiLight" panose="020B0502040204020203" pitchFamily="34" charset="0"/>
-            </a:endParaRPr>
+              <a:t>Robotika és orvosi eszközök, űrkutatás</a:t>
+            </a:r>
           </a:p>
         </p:txBody>
       </p:sp>
@@ -4693,13 +4679,6 @@
   <p:clrMapOvr>
     <a:masterClrMapping/>
   </p:clrMapOvr>
-  <p:timing>
-    <p:tnLst>
-      <p:par>
-        <p:cTn id="1" dur="indefinite" restart="never" nodeType="tmRoot"/>
-      </p:par>
-    </p:tnLst>
-  </p:timing>
 </p:sld>
 </file>
 
@@ -4722,7 +4701,65 @@
       </p:grpSpPr>
       <p:sp>
         <p:nvSpPr>
-          <p:cNvPr id="2" name="Cím 1"/>
+          <p:cNvPr id="3" name="Tartalom helye 2"/>
+          <p:cNvSpPr>
+            <a:spLocks noGrp="1"/>
+          </p:cNvSpPr>
+          <p:nvPr>
+            <p:ph idx="1"/>
+          </p:nvPr>
+        </p:nvSpPr>
+        <p:spPr>
+          <a:xfrm>
+            <a:off x="2303355" y="2332774"/>
+            <a:ext cx="7796540" cy="3997828"/>
+          </a:xfrm>
+        </p:spPr>
+        <p:txBody>
+          <a:bodyPr/>
+          <a:lstStyle/>
+          <a:p>
+            <a:r>
+              <a:rPr lang="hu-HU" sz="2400" dirty="0"/>
+              <a:t>2012-ben 99 milliárd értékű robotot szállított</a:t>
+            </a:r>
+          </a:p>
+          <a:p>
+            <a:r>
+              <a:rPr lang="hu-HU" sz="2400" dirty="0"/>
+              <a:t>A világ vezető robot nemzetének nevezik</a:t>
+            </a:r>
+          </a:p>
+          <a:p>
+            <a:r>
+              <a:rPr lang="hu-HU" sz="2400" dirty="0">
+                <a:latin typeface="Arial" panose="020B0604020202020204" pitchFamily="34" charset="0"/>
+              </a:rPr>
+              <a:t>K</a:t>
+            </a:r>
+            <a:r>
+              <a:rPr lang="hu-HU" sz="2400" b="0" i="0" dirty="0">
+                <a:effectLst/>
+                <a:latin typeface="Arial" panose="020B0604020202020204" pitchFamily="34" charset="0"/>
+              </a:rPr>
+              <a:t>örülbelül negyedmilliónyi ipari robotmunkást foglalkoztat</a:t>
+            </a:r>
+            <a:endParaRPr lang="hu-HU" sz="2400" dirty="0"/>
+          </a:p>
+          <a:p>
+            <a:endParaRPr lang="hu-HU" dirty="0"/>
+          </a:p>
+        </p:txBody>
+      </p:sp>
+      <p:sp>
+        <p:nvSpPr>
+          <p:cNvPr id="4" name="Cím 1">
+            <a:extLst>
+              <a:ext uri="{FF2B5EF4-FFF2-40B4-BE49-F238E27FC236}">
+                <a16:creationId xmlns:a16="http://schemas.microsoft.com/office/drawing/2014/main" id="{2F24A1B1-E7A8-0563-CDD6-11274ACB9596}"/>
+              </a:ext>
+            </a:extLst>
+          </p:cNvPr>
           <p:cNvSpPr>
             <a:spLocks noGrp="1"/>
           </p:cNvSpPr>
@@ -4730,36 +4767,25 @@
             <p:ph type="title"/>
           </p:nvPr>
         </p:nvSpPr>
-        <p:spPr/>
-        <p:txBody>
-          <a:bodyPr/>
+        <p:spPr>
+          <a:xfrm>
+            <a:off x="1464985" y="895452"/>
+            <a:ext cx="4736640" cy="1077229"/>
+          </a:xfrm>
+        </p:spPr>
+        <p:txBody>
+          <a:bodyPr>
+            <a:normAutofit/>
+          </a:bodyPr>
           <a:lstStyle/>
           <a:p>
             <a:pPr algn="ctr"/>
             <a:r>
-              <a:rPr lang="hu-HU" dirty="0" smtClean="0"/>
-              <a:t>Nukleáris energia</a:t>
-            </a:r>
-            <a:endParaRPr lang="hu-HU" dirty="0"/>
-          </a:p>
-        </p:txBody>
-      </p:sp>
-      <p:sp>
-        <p:nvSpPr>
-          <p:cNvPr id="3" name="Tartalom helye 2"/>
-          <p:cNvSpPr>
-            <a:spLocks noGrp="1"/>
-          </p:cNvSpPr>
-          <p:nvPr>
-            <p:ph idx="1"/>
-          </p:nvPr>
-        </p:nvSpPr>
-        <p:spPr/>
-        <p:txBody>
-          <a:bodyPr/>
-          <a:lstStyle/>
-          <a:p>
-            <a:endParaRPr lang="hu-HU" dirty="0"/>
+              <a:rPr lang="hu-HU" sz="4000" dirty="0">
+                <a:latin typeface="Georgia" panose="02040502050405020303" pitchFamily="18" charset="0"/>
+              </a:rPr>
+              <a:t>Robotika</a:t>
+            </a:r>
           </a:p>
         </p:txBody>
       </p:sp>
@@ -4773,13 +4799,6 @@
   <p:clrMapOvr>
     <a:masterClrMapping/>
   </p:clrMapOvr>
-  <p:timing>
-    <p:tnLst>
-      <p:par>
-        <p:cTn id="1" dur="indefinite" restart="never" nodeType="tmRoot"/>
-      </p:par>
-    </p:tnLst>
-  </p:timing>
 </p:sld>
 </file>
 
@@ -4802,7 +4821,66 @@
       </p:grpSpPr>
       <p:sp>
         <p:nvSpPr>
-          <p:cNvPr id="2" name="Cím 1"/>
+          <p:cNvPr id="3" name="Tartalom helye 2"/>
+          <p:cNvSpPr>
+            <a:spLocks noGrp="1"/>
+          </p:cNvSpPr>
+          <p:nvPr>
+            <p:ph idx="1"/>
+          </p:nvPr>
+        </p:nvSpPr>
+        <p:spPr>
+          <a:xfrm>
+            <a:off x="2197730" y="1257708"/>
+            <a:ext cx="7796540" cy="3988642"/>
+          </a:xfrm>
+        </p:spPr>
+        <p:txBody>
+          <a:bodyPr/>
+          <a:lstStyle/>
+          <a:p>
+            <a:r>
+              <a:rPr lang="hu-HU" sz="2400" dirty="0"/>
+              <a:t>Honda, Sony, Fujitsu, Toyota</a:t>
+            </a:r>
+          </a:p>
+          <a:p>
+            <a:pPr marL="0" indent="0">
+              <a:buNone/>
+            </a:pPr>
+            <a:endParaRPr lang="hu-HU" sz="2400" dirty="0"/>
+          </a:p>
+          <a:p>
+            <a:pPr marL="0" indent="0">
+              <a:buNone/>
+            </a:pPr>
+            <a:r>
+              <a:rPr lang="hu-HU" sz="2400" dirty="0"/>
+              <a:t>	</a:t>
+            </a:r>
+            <a:r>
+              <a:rPr lang="hu-HU" b="0" i="0" dirty="0">
+                <a:solidFill>
+                  <a:srgbClr val="202122"/>
+                </a:solidFill>
+                <a:effectLst/>
+                <a:latin typeface="Arial" panose="020B0604020202020204" pitchFamily="34" charset="0"/>
+              </a:rPr>
+              <a:t>.</a:t>
+            </a:r>
+            <a:endParaRPr lang="hu-HU" dirty="0"/>
+          </a:p>
+        </p:txBody>
+      </p:sp>
+      <p:sp>
+        <p:nvSpPr>
+          <p:cNvPr id="6" name="Cím 1">
+            <a:extLst>
+              <a:ext uri="{FF2B5EF4-FFF2-40B4-BE49-F238E27FC236}">
+                <a16:creationId xmlns:a16="http://schemas.microsoft.com/office/drawing/2014/main" id="{7591AF9E-E099-B6E0-5296-8F6A79D54FD2}"/>
+              </a:ext>
+            </a:extLst>
+          </p:cNvPr>
           <p:cNvSpPr>
             <a:spLocks noGrp="1"/>
           </p:cNvSpPr>
@@ -4810,56 +4888,216 @@
             <p:ph type="title"/>
           </p:nvPr>
         </p:nvSpPr>
-        <p:spPr/>
-        <p:txBody>
-          <a:bodyPr/>
+        <p:spPr>
+          <a:xfrm>
+            <a:off x="1655108" y="904756"/>
+            <a:ext cx="4736640" cy="1077229"/>
+          </a:xfrm>
+        </p:spPr>
+        <p:txBody>
+          <a:bodyPr>
+            <a:normAutofit/>
+          </a:bodyPr>
           <a:lstStyle/>
           <a:p>
             <a:pPr algn="ctr"/>
             <a:r>
-              <a:rPr lang="hu-HU" dirty="0" smtClean="0"/>
-              <a:t>Robotika</a:t>
-            </a:r>
-            <a:endParaRPr lang="hu-HU" dirty="0"/>
-          </a:p>
-        </p:txBody>
-      </p:sp>
-      <p:sp>
-        <p:nvSpPr>
-          <p:cNvPr id="3" name="Tartalom helye 2"/>
-          <p:cNvSpPr>
-            <a:spLocks noGrp="1"/>
-          </p:cNvSpPr>
-          <p:nvPr>
-            <p:ph idx="1"/>
-          </p:nvPr>
-        </p:nvSpPr>
-        <p:spPr/>
-        <p:txBody>
-          <a:bodyPr/>
-          <a:lstStyle/>
-          <a:p>
-            <a:r>
-              <a:rPr lang="hu-HU" dirty="0" smtClean="0"/>
-              <a:t>A világ </a:t>
-            </a:r>
-            <a:r>
-              <a:rPr lang="hu-HU" dirty="0"/>
-              <a:t>vezető </a:t>
-            </a:r>
-            <a:r>
-              <a:rPr lang="hu-HU" dirty="0" smtClean="0"/>
-              <a:t>robot nemzetének nevezik</a:t>
-            </a:r>
-          </a:p>
-          <a:p>
-            <a:r>
-              <a:rPr lang="hu-HU" dirty="0" smtClean="0"/>
-              <a:t>3,4 milliárd yen () értéjű robotot szállított 2012-ben</a:t>
-            </a:r>
-          </a:p>
-        </p:txBody>
-      </p:sp>
+              <a:rPr lang="hu-HU" sz="4000" dirty="0">
+                <a:latin typeface="Georgia" panose="02040502050405020303" pitchFamily="18" charset="0"/>
+              </a:rPr>
+              <a:t>Főbb gyártók</a:t>
+            </a:r>
+          </a:p>
+        </p:txBody>
+      </p:sp>
+      <p:pic>
+        <p:nvPicPr>
+          <p:cNvPr id="8" name="Kép 7">
+            <a:extLst>
+              <a:ext uri="{FF2B5EF4-FFF2-40B4-BE49-F238E27FC236}">
+                <a16:creationId xmlns:a16="http://schemas.microsoft.com/office/drawing/2014/main" id="{CBAB08FF-DFDF-434A-0D47-ABF3D55FFEC5}"/>
+              </a:ext>
+            </a:extLst>
+          </p:cNvPr>
+          <p:cNvPicPr>
+            <a:picLocks noChangeAspect="1"/>
+          </p:cNvPicPr>
+          <p:nvPr/>
+        </p:nvPicPr>
+        <p:blipFill rotWithShape="1">
+          <a:blip r:embed="rId2">
+            <a:extLst>
+              <a:ext uri="{28A0092B-C50C-407E-A947-70E740481C1C}">
+                <a14:useLocalDpi xmlns:a14="http://schemas.microsoft.com/office/drawing/2010/main" val="0"/>
+              </a:ext>
+            </a:extLst>
+          </a:blip>
+          <a:srcRect l="6171" t="5412" r="10334" b="13193"/>
+          <a:stretch/>
+        </p:blipFill>
+        <p:spPr>
+          <a:xfrm>
+            <a:off x="2040143" y="1981985"/>
+            <a:ext cx="8111713" cy="4477529"/>
+          </a:xfrm>
+          <a:prstGeom prst="rect">
+            <a:avLst/>
+          </a:prstGeom>
+        </p:spPr>
+      </p:pic>
+      <p:pic>
+        <p:nvPicPr>
+          <p:cNvPr id="10" name="Kép 9" descr="A képen beltéri, szerszám, rendetlen látható&#10;&#10;Automatikusan generált leírás">
+            <a:extLst>
+              <a:ext uri="{FF2B5EF4-FFF2-40B4-BE49-F238E27FC236}">
+                <a16:creationId xmlns:a16="http://schemas.microsoft.com/office/drawing/2014/main" id="{852F1887-7BA4-994E-2FC2-449F2CC33AD9}"/>
+              </a:ext>
+            </a:extLst>
+          </p:cNvPr>
+          <p:cNvPicPr>
+            <a:picLocks noChangeAspect="1"/>
+          </p:cNvPicPr>
+          <p:nvPr/>
+        </p:nvPicPr>
+        <p:blipFill>
+          <a:blip r:embed="rId3">
+            <a:extLst>
+              <a:ext uri="{28A0092B-C50C-407E-A947-70E740481C1C}">
+                <a14:useLocalDpi xmlns:a14="http://schemas.microsoft.com/office/drawing/2010/main" val="0"/>
+              </a:ext>
+            </a:extLst>
+          </a:blip>
+          <a:stretch>
+            <a:fillRect/>
+          </a:stretch>
+        </p:blipFill>
+        <p:spPr>
+          <a:xfrm>
+            <a:off x="3119106" y="2555870"/>
+            <a:ext cx="5782765" cy="3238348"/>
+          </a:xfrm>
+          <a:prstGeom prst="rect">
+            <a:avLst/>
+          </a:prstGeom>
+        </p:spPr>
+      </p:pic>
+      <p:pic>
+        <p:nvPicPr>
+          <p:cNvPr id="12" name="Kép 11" descr="A képen szöveg, emlősök látható">
+            <a:extLst>
+              <a:ext uri="{FF2B5EF4-FFF2-40B4-BE49-F238E27FC236}">
+                <a16:creationId xmlns:a16="http://schemas.microsoft.com/office/drawing/2014/main" id="{849B2E1E-67E8-54E9-0695-1B75E3AACE1D}"/>
+              </a:ext>
+            </a:extLst>
+          </p:cNvPr>
+          <p:cNvPicPr>
+            <a:picLocks noChangeAspect="1"/>
+          </p:cNvPicPr>
+          <p:nvPr/>
+        </p:nvPicPr>
+        <p:blipFill rotWithShape="1">
+          <a:blip r:embed="rId4">
+            <a:extLst>
+              <a:ext uri="{28A0092B-C50C-407E-A947-70E740481C1C}">
+                <a14:useLocalDpi xmlns:a14="http://schemas.microsoft.com/office/drawing/2010/main" val="0"/>
+              </a:ext>
+            </a:extLst>
+          </a:blip>
+          <a:srcRect l="2634" t="2719" r="4146" b="11142"/>
+          <a:stretch/>
+        </p:blipFill>
+        <p:spPr>
+          <a:xfrm>
+            <a:off x="2787477" y="2555870"/>
+            <a:ext cx="6617046" cy="3546726"/>
+          </a:xfrm>
+          <a:prstGeom prst="rect">
+            <a:avLst/>
+          </a:prstGeom>
+        </p:spPr>
+      </p:pic>
+      <p:pic>
+        <p:nvPicPr>
+          <p:cNvPr id="13" name="Kép 12" descr="ábra Távirányítós robot MHI-MEISTeR.  Ennek a robotnak a fejlesztését a Természeti Erőforrások és Energia Ügynökség megbízásából az IRID, a fejlesztés egy részét pedig a Mitsubishi Heavy Industries végezte, amely az IRID tagja.">
+            <a:extLst>
+              <a:ext uri="{FF2B5EF4-FFF2-40B4-BE49-F238E27FC236}">
+                <a16:creationId xmlns:a16="http://schemas.microsoft.com/office/drawing/2014/main" id="{5AD71C89-5488-90F0-D9BE-FB237AC57C29}"/>
+              </a:ext>
+            </a:extLst>
+          </p:cNvPr>
+          <p:cNvPicPr>
+            <a:picLocks noChangeAspect="1"/>
+          </p:cNvPicPr>
+          <p:nvPr/>
+        </p:nvPicPr>
+        <p:blipFill>
+          <a:blip r:embed="rId5">
+            <a:extLst>
+              <a:ext uri="{28A0092B-C50C-407E-A947-70E740481C1C}">
+                <a14:useLocalDpi xmlns:a14="http://schemas.microsoft.com/office/drawing/2010/main" val="0"/>
+              </a:ext>
+            </a:extLst>
+          </a:blip>
+          <a:srcRect/>
+          <a:stretch>
+            <a:fillRect/>
+          </a:stretch>
+        </p:blipFill>
+        <p:spPr bwMode="auto">
+          <a:xfrm>
+            <a:off x="3119106" y="2087630"/>
+            <a:ext cx="5688318" cy="4266239"/>
+          </a:xfrm>
+          <a:prstGeom prst="rect">
+            <a:avLst/>
+          </a:prstGeom>
+          <a:noFill/>
+          <a:ln>
+            <a:noFill/>
+          </a:ln>
+        </p:spPr>
+      </p:pic>
+      <p:pic>
+        <p:nvPicPr>
+          <p:cNvPr id="14" name="Kép 13" descr="ábra A mester manipulátorokat kezelő sebész">
+            <a:extLst>
+              <a:ext uri="{FF2B5EF4-FFF2-40B4-BE49-F238E27FC236}">
+                <a16:creationId xmlns:a16="http://schemas.microsoft.com/office/drawing/2014/main" id="{66C85FE1-9A6F-F320-0C68-6E2C2AF3C436}"/>
+              </a:ext>
+            </a:extLst>
+          </p:cNvPr>
+          <p:cNvPicPr>
+            <a:picLocks noChangeAspect="1"/>
+          </p:cNvPicPr>
+          <p:nvPr/>
+        </p:nvPicPr>
+        <p:blipFill>
+          <a:blip r:embed="rId6">
+            <a:extLst>
+              <a:ext uri="{28A0092B-C50C-407E-A947-70E740481C1C}">
+                <a14:useLocalDpi xmlns:a14="http://schemas.microsoft.com/office/drawing/2010/main" val="0"/>
+              </a:ext>
+            </a:extLst>
+          </a:blip>
+          <a:srcRect/>
+          <a:stretch>
+            <a:fillRect/>
+          </a:stretch>
+        </p:blipFill>
+        <p:spPr bwMode="auto">
+          <a:xfrm>
+            <a:off x="2546285" y="1861668"/>
+            <a:ext cx="7099427" cy="4718161"/>
+          </a:xfrm>
+          <a:prstGeom prst="rect">
+            <a:avLst/>
+          </a:prstGeom>
+          <a:noFill/>
+          <a:ln>
+            <a:noFill/>
+          </a:ln>
+        </p:spPr>
+      </p:pic>
     </p:spTree>
     <p:extLst>
       <p:ext uri="{BB962C8B-B14F-4D97-AF65-F5344CB8AC3E}">
@@ -4873,7 +5111,485 @@
   <p:timing>
     <p:tnLst>
       <p:par>
-        <p:cTn id="1" dur="indefinite" restart="never" nodeType="tmRoot"/>
+        <p:cTn id="1" dur="indefinite" restart="never" nodeType="tmRoot">
+          <p:childTnLst>
+            <p:seq concurrent="1" nextAc="seek">
+              <p:cTn id="2" dur="indefinite" nodeType="mainSeq">
+                <p:childTnLst>
+                  <p:par>
+                    <p:cTn id="3" fill="hold">
+                      <p:stCondLst>
+                        <p:cond delay="indefinite"/>
+                      </p:stCondLst>
+                      <p:childTnLst>
+                        <p:par>
+                          <p:cTn id="4" fill="hold">
+                            <p:stCondLst>
+                              <p:cond delay="0"/>
+                            </p:stCondLst>
+                            <p:childTnLst>
+                              <p:par>
+                                <p:cTn id="5" presetID="2" presetClass="entr" presetSubtype="4" fill="hold" nodeType="clickEffect">
+                                  <p:stCondLst>
+                                    <p:cond delay="0"/>
+                                  </p:stCondLst>
+                                  <p:childTnLst>
+                                    <p:set>
+                                      <p:cBhvr>
+                                        <p:cTn id="6" dur="1" fill="hold">
+                                          <p:stCondLst>
+                                            <p:cond delay="0"/>
+                                          </p:stCondLst>
+                                        </p:cTn>
+                                        <p:tgtEl>
+                                          <p:spTgt spid="8"/>
+                                        </p:tgtEl>
+                                        <p:attrNameLst>
+                                          <p:attrName>style.visibility</p:attrName>
+                                        </p:attrNameLst>
+                                      </p:cBhvr>
+                                      <p:to>
+                                        <p:strVal val="visible"/>
+                                      </p:to>
+                                    </p:set>
+                                    <p:anim calcmode="lin" valueType="num">
+                                      <p:cBhvr additive="base">
+                                        <p:cTn id="7" dur="500" fill="hold"/>
+                                        <p:tgtEl>
+                                          <p:spTgt spid="8"/>
+                                        </p:tgtEl>
+                                        <p:attrNameLst>
+                                          <p:attrName>ppt_x</p:attrName>
+                                        </p:attrNameLst>
+                                      </p:cBhvr>
+                                      <p:tavLst>
+                                        <p:tav tm="0">
+                                          <p:val>
+                                            <p:strVal val="#ppt_x"/>
+                                          </p:val>
+                                        </p:tav>
+                                        <p:tav tm="100000">
+                                          <p:val>
+                                            <p:strVal val="#ppt_x"/>
+                                          </p:val>
+                                        </p:tav>
+                                      </p:tavLst>
+                                    </p:anim>
+                                    <p:anim calcmode="lin" valueType="num">
+                                      <p:cBhvr additive="base">
+                                        <p:cTn id="8" dur="500" fill="hold"/>
+                                        <p:tgtEl>
+                                          <p:spTgt spid="8"/>
+                                        </p:tgtEl>
+                                        <p:attrNameLst>
+                                          <p:attrName>ppt_y</p:attrName>
+                                        </p:attrNameLst>
+                                      </p:cBhvr>
+                                      <p:tavLst>
+                                        <p:tav tm="0">
+                                          <p:val>
+                                            <p:strVal val="1+#ppt_h/2"/>
+                                          </p:val>
+                                        </p:tav>
+                                        <p:tav tm="100000">
+                                          <p:val>
+                                            <p:strVal val="#ppt_y"/>
+                                          </p:val>
+                                        </p:tav>
+                                      </p:tavLst>
+                                    </p:anim>
+                                  </p:childTnLst>
+                                </p:cTn>
+                              </p:par>
+                            </p:childTnLst>
+                          </p:cTn>
+                        </p:par>
+                      </p:childTnLst>
+                    </p:cTn>
+                  </p:par>
+                  <p:par>
+                    <p:cTn id="9" fill="hold">
+                      <p:stCondLst>
+                        <p:cond delay="indefinite"/>
+                      </p:stCondLst>
+                      <p:childTnLst>
+                        <p:par>
+                          <p:cTn id="10" fill="hold">
+                            <p:stCondLst>
+                              <p:cond delay="0"/>
+                            </p:stCondLst>
+                            <p:childTnLst>
+                              <p:par>
+                                <p:cTn id="11" presetID="2" presetClass="entr" presetSubtype="4" fill="hold" nodeType="clickEffect">
+                                  <p:stCondLst>
+                                    <p:cond delay="0"/>
+                                  </p:stCondLst>
+                                  <p:childTnLst>
+                                    <p:set>
+                                      <p:cBhvr>
+                                        <p:cTn id="12" dur="1" fill="hold">
+                                          <p:stCondLst>
+                                            <p:cond delay="0"/>
+                                          </p:stCondLst>
+                                        </p:cTn>
+                                        <p:tgtEl>
+                                          <p:spTgt spid="10"/>
+                                        </p:tgtEl>
+                                        <p:attrNameLst>
+                                          <p:attrName>style.visibility</p:attrName>
+                                        </p:attrNameLst>
+                                      </p:cBhvr>
+                                      <p:to>
+                                        <p:strVal val="visible"/>
+                                      </p:to>
+                                    </p:set>
+                                    <p:anim calcmode="lin" valueType="num">
+                                      <p:cBhvr additive="base">
+                                        <p:cTn id="13" dur="500" fill="hold"/>
+                                        <p:tgtEl>
+                                          <p:spTgt spid="10"/>
+                                        </p:tgtEl>
+                                        <p:attrNameLst>
+                                          <p:attrName>ppt_x</p:attrName>
+                                        </p:attrNameLst>
+                                      </p:cBhvr>
+                                      <p:tavLst>
+                                        <p:tav tm="0">
+                                          <p:val>
+                                            <p:strVal val="#ppt_x"/>
+                                          </p:val>
+                                        </p:tav>
+                                        <p:tav tm="100000">
+                                          <p:val>
+                                            <p:strVal val="#ppt_x"/>
+                                          </p:val>
+                                        </p:tav>
+                                      </p:tavLst>
+                                    </p:anim>
+                                    <p:anim calcmode="lin" valueType="num">
+                                      <p:cBhvr additive="base">
+                                        <p:cTn id="14" dur="500" fill="hold"/>
+                                        <p:tgtEl>
+                                          <p:spTgt spid="10"/>
+                                        </p:tgtEl>
+                                        <p:attrNameLst>
+                                          <p:attrName>ppt_y</p:attrName>
+                                        </p:attrNameLst>
+                                      </p:cBhvr>
+                                      <p:tavLst>
+                                        <p:tav tm="0">
+                                          <p:val>
+                                            <p:strVal val="1+#ppt_h/2"/>
+                                          </p:val>
+                                        </p:tav>
+                                        <p:tav tm="100000">
+                                          <p:val>
+                                            <p:strVal val="#ppt_y"/>
+                                          </p:val>
+                                        </p:tav>
+                                      </p:tavLst>
+                                    </p:anim>
+                                  </p:childTnLst>
+                                </p:cTn>
+                              </p:par>
+                            </p:childTnLst>
+                          </p:cTn>
+                        </p:par>
+                      </p:childTnLst>
+                    </p:cTn>
+                  </p:par>
+                  <p:par>
+                    <p:cTn id="15" fill="hold">
+                      <p:stCondLst>
+                        <p:cond delay="indefinite"/>
+                      </p:stCondLst>
+                      <p:childTnLst>
+                        <p:par>
+                          <p:cTn id="16" fill="hold">
+                            <p:stCondLst>
+                              <p:cond delay="0"/>
+                            </p:stCondLst>
+                            <p:childTnLst>
+                              <p:par>
+                                <p:cTn id="17" presetID="2" presetClass="entr" presetSubtype="4" fill="hold" nodeType="clickEffect">
+                                  <p:stCondLst>
+                                    <p:cond delay="0"/>
+                                  </p:stCondLst>
+                                  <p:childTnLst>
+                                    <p:set>
+                                      <p:cBhvr>
+                                        <p:cTn id="18" dur="1" fill="hold">
+                                          <p:stCondLst>
+                                            <p:cond delay="0"/>
+                                          </p:stCondLst>
+                                        </p:cTn>
+                                        <p:tgtEl>
+                                          <p:spTgt spid="12"/>
+                                        </p:tgtEl>
+                                        <p:attrNameLst>
+                                          <p:attrName>style.visibility</p:attrName>
+                                        </p:attrNameLst>
+                                      </p:cBhvr>
+                                      <p:to>
+                                        <p:strVal val="visible"/>
+                                      </p:to>
+                                    </p:set>
+                                    <p:anim calcmode="lin" valueType="num">
+                                      <p:cBhvr additive="base">
+                                        <p:cTn id="19" dur="500" fill="hold"/>
+                                        <p:tgtEl>
+                                          <p:spTgt spid="12"/>
+                                        </p:tgtEl>
+                                        <p:attrNameLst>
+                                          <p:attrName>ppt_x</p:attrName>
+                                        </p:attrNameLst>
+                                      </p:cBhvr>
+                                      <p:tavLst>
+                                        <p:tav tm="0">
+                                          <p:val>
+                                            <p:strVal val="#ppt_x"/>
+                                          </p:val>
+                                        </p:tav>
+                                        <p:tav tm="100000">
+                                          <p:val>
+                                            <p:strVal val="#ppt_x"/>
+                                          </p:val>
+                                        </p:tav>
+                                      </p:tavLst>
+                                    </p:anim>
+                                    <p:anim calcmode="lin" valueType="num">
+                                      <p:cBhvr additive="base">
+                                        <p:cTn id="20" dur="500" fill="hold"/>
+                                        <p:tgtEl>
+                                          <p:spTgt spid="12"/>
+                                        </p:tgtEl>
+                                        <p:attrNameLst>
+                                          <p:attrName>ppt_y</p:attrName>
+                                        </p:attrNameLst>
+                                      </p:cBhvr>
+                                      <p:tavLst>
+                                        <p:tav tm="0">
+                                          <p:val>
+                                            <p:strVal val="1+#ppt_h/2"/>
+                                          </p:val>
+                                        </p:tav>
+                                        <p:tav tm="100000">
+                                          <p:val>
+                                            <p:strVal val="#ppt_y"/>
+                                          </p:val>
+                                        </p:tav>
+                                      </p:tavLst>
+                                    </p:anim>
+                                  </p:childTnLst>
+                                </p:cTn>
+                              </p:par>
+                            </p:childTnLst>
+                          </p:cTn>
+                        </p:par>
+                      </p:childTnLst>
+                    </p:cTn>
+                  </p:par>
+                  <p:par>
+                    <p:cTn id="21" fill="hold">
+                      <p:stCondLst>
+                        <p:cond delay="indefinite"/>
+                      </p:stCondLst>
+                      <p:childTnLst>
+                        <p:par>
+                          <p:cTn id="22" fill="hold">
+                            <p:stCondLst>
+                              <p:cond delay="0"/>
+                            </p:stCondLst>
+                            <p:childTnLst>
+                              <p:par>
+                                <p:cTn id="23" presetID="2" presetClass="entr" presetSubtype="4" fill="hold" nodeType="clickEffect">
+                                  <p:stCondLst>
+                                    <p:cond delay="0"/>
+                                  </p:stCondLst>
+                                  <p:childTnLst>
+                                    <p:set>
+                                      <p:cBhvr>
+                                        <p:cTn id="24" dur="1" fill="hold">
+                                          <p:stCondLst>
+                                            <p:cond delay="0"/>
+                                          </p:stCondLst>
+                                        </p:cTn>
+                                        <p:tgtEl>
+                                          <p:spTgt spid="13"/>
+                                        </p:tgtEl>
+                                        <p:attrNameLst>
+                                          <p:attrName>style.visibility</p:attrName>
+                                        </p:attrNameLst>
+                                      </p:cBhvr>
+                                      <p:to>
+                                        <p:strVal val="visible"/>
+                                      </p:to>
+                                    </p:set>
+                                    <p:anim calcmode="lin" valueType="num">
+                                      <p:cBhvr additive="base">
+                                        <p:cTn id="25" dur="500" fill="hold"/>
+                                        <p:tgtEl>
+                                          <p:spTgt spid="13"/>
+                                        </p:tgtEl>
+                                        <p:attrNameLst>
+                                          <p:attrName>ppt_x</p:attrName>
+                                        </p:attrNameLst>
+                                      </p:cBhvr>
+                                      <p:tavLst>
+                                        <p:tav tm="0">
+                                          <p:val>
+                                            <p:strVal val="#ppt_x"/>
+                                          </p:val>
+                                        </p:tav>
+                                        <p:tav tm="100000">
+                                          <p:val>
+                                            <p:strVal val="#ppt_x"/>
+                                          </p:val>
+                                        </p:tav>
+                                      </p:tavLst>
+                                    </p:anim>
+                                    <p:anim calcmode="lin" valueType="num">
+                                      <p:cBhvr additive="base">
+                                        <p:cTn id="26" dur="500" fill="hold"/>
+                                        <p:tgtEl>
+                                          <p:spTgt spid="13"/>
+                                        </p:tgtEl>
+                                        <p:attrNameLst>
+                                          <p:attrName>ppt_y</p:attrName>
+                                        </p:attrNameLst>
+                                      </p:cBhvr>
+                                      <p:tavLst>
+                                        <p:tav tm="0">
+                                          <p:val>
+                                            <p:strVal val="1+#ppt_h/2"/>
+                                          </p:val>
+                                        </p:tav>
+                                        <p:tav tm="100000">
+                                          <p:val>
+                                            <p:strVal val="#ppt_y"/>
+                                          </p:val>
+                                        </p:tav>
+                                      </p:tavLst>
+                                    </p:anim>
+                                  </p:childTnLst>
+                                </p:cTn>
+                              </p:par>
+                            </p:childTnLst>
+                          </p:cTn>
+                        </p:par>
+                      </p:childTnLst>
+                    </p:cTn>
+                  </p:par>
+                  <p:par>
+                    <p:cTn id="27" fill="hold">
+                      <p:stCondLst>
+                        <p:cond delay="indefinite"/>
+                      </p:stCondLst>
+                      <p:childTnLst>
+                        <p:par>
+                          <p:cTn id="28" fill="hold">
+                            <p:stCondLst>
+                              <p:cond delay="0"/>
+                            </p:stCondLst>
+                            <p:childTnLst>
+                              <p:par>
+                                <p:cTn id="29" presetID="2" presetClass="entr" presetSubtype="4" fill="hold" nodeType="clickEffect">
+                                  <p:stCondLst>
+                                    <p:cond delay="0"/>
+                                  </p:stCondLst>
+                                  <p:childTnLst>
+                                    <p:set>
+                                      <p:cBhvr>
+                                        <p:cTn id="30" dur="1" fill="hold">
+                                          <p:stCondLst>
+                                            <p:cond delay="0"/>
+                                          </p:stCondLst>
+                                        </p:cTn>
+                                        <p:tgtEl>
+                                          <p:spTgt spid="14"/>
+                                        </p:tgtEl>
+                                        <p:attrNameLst>
+                                          <p:attrName>style.visibility</p:attrName>
+                                        </p:attrNameLst>
+                                      </p:cBhvr>
+                                      <p:to>
+                                        <p:strVal val="visible"/>
+                                      </p:to>
+                                    </p:set>
+                                    <p:anim calcmode="lin" valueType="num">
+                                      <p:cBhvr additive="base">
+                                        <p:cTn id="31" dur="500" fill="hold"/>
+                                        <p:tgtEl>
+                                          <p:spTgt spid="14"/>
+                                        </p:tgtEl>
+                                        <p:attrNameLst>
+                                          <p:attrName>ppt_x</p:attrName>
+                                        </p:attrNameLst>
+                                      </p:cBhvr>
+                                      <p:tavLst>
+                                        <p:tav tm="0">
+                                          <p:val>
+                                            <p:strVal val="#ppt_x"/>
+                                          </p:val>
+                                        </p:tav>
+                                        <p:tav tm="100000">
+                                          <p:val>
+                                            <p:strVal val="#ppt_x"/>
+                                          </p:val>
+                                        </p:tav>
+                                      </p:tavLst>
+                                    </p:anim>
+                                    <p:anim calcmode="lin" valueType="num">
+                                      <p:cBhvr additive="base">
+                                        <p:cTn id="32" dur="500" fill="hold"/>
+                                        <p:tgtEl>
+                                          <p:spTgt spid="14"/>
+                                        </p:tgtEl>
+                                        <p:attrNameLst>
+                                          <p:attrName>ppt_y</p:attrName>
+                                        </p:attrNameLst>
+                                      </p:cBhvr>
+                                      <p:tavLst>
+                                        <p:tav tm="0">
+                                          <p:val>
+                                            <p:strVal val="1+#ppt_h/2"/>
+                                          </p:val>
+                                        </p:tav>
+                                        <p:tav tm="100000">
+                                          <p:val>
+                                            <p:strVal val="#ppt_y"/>
+                                          </p:val>
+                                        </p:tav>
+                                      </p:tavLst>
+                                    </p:anim>
+                                  </p:childTnLst>
+                                </p:cTn>
+                              </p:par>
+                            </p:childTnLst>
+                          </p:cTn>
+                        </p:par>
+                      </p:childTnLst>
+                    </p:cTn>
+                  </p:par>
+                </p:childTnLst>
+              </p:cTn>
+              <p:prevCondLst>
+                <p:cond evt="onPrev" delay="0">
+                  <p:tgtEl>
+                    <p:sldTgt/>
+                  </p:tgtEl>
+                </p:cond>
+              </p:prevCondLst>
+              <p:nextCondLst>
+                <p:cond evt="onNext" delay="0">
+                  <p:tgtEl>
+                    <p:sldTgt/>
+                  </p:tgtEl>
+                </p:cond>
+              </p:nextCondLst>
+            </p:seq>
+          </p:childTnLst>
+        </p:cTn>
       </p:par>
     </p:tnLst>
   </p:timing>
@@ -4899,7 +5615,59 @@
       </p:grpSpPr>
       <p:sp>
         <p:nvSpPr>
-          <p:cNvPr id="2" name="Cím 1"/>
+          <p:cNvPr id="3" name="Tartalom helye 2"/>
+          <p:cNvSpPr>
+            <a:spLocks noGrp="1"/>
+          </p:cNvSpPr>
+          <p:nvPr>
+            <p:ph idx="1"/>
+          </p:nvPr>
+        </p:nvSpPr>
+        <p:spPr/>
+        <p:txBody>
+          <a:bodyPr/>
+          <a:lstStyle/>
+          <a:p>
+            <a:r>
+              <a:rPr lang="hu-HU" dirty="0"/>
+              <a:t>Átlagosan : 18mp késéssel</a:t>
+            </a:r>
+          </a:p>
+          <a:p>
+            <a:r>
+              <a:rPr lang="hu-HU" dirty="0"/>
+              <a:t>Földrengés és tájfun biztosak</a:t>
+            </a:r>
+          </a:p>
+          <a:p>
+            <a:r>
+              <a:rPr lang="hu-HU" dirty="0"/>
+              <a:t>Hagyományos vasút - 443km/h </a:t>
+            </a:r>
+          </a:p>
+          <a:p>
+            <a:r>
+              <a:rPr lang="hu-HU" dirty="0"/>
+              <a:t>Mágnesvasút – 580km/h</a:t>
+            </a:r>
+          </a:p>
+          <a:p>
+            <a:pPr marL="0" indent="0">
+              <a:buNone/>
+            </a:pPr>
+            <a:endParaRPr lang="hu-HU" dirty="0"/>
+          </a:p>
+        </p:txBody>
+      </p:sp>
+      <p:sp>
+        <p:nvSpPr>
+          <p:cNvPr id="8" name="Cím 1">
+            <a:extLst>
+              <a:ext uri="{FF2B5EF4-FFF2-40B4-BE49-F238E27FC236}">
+                <a16:creationId xmlns:a16="http://schemas.microsoft.com/office/drawing/2014/main" id="{15335E79-6728-331C-DD1D-A19639799E2C}"/>
+              </a:ext>
+            </a:extLst>
+          </p:cNvPr>
           <p:cNvSpPr>
             <a:spLocks noGrp="1"/>
           </p:cNvSpPr>
@@ -4907,36 +5675,25 @@
             <p:ph type="title"/>
           </p:nvPr>
         </p:nvSpPr>
-        <p:spPr/>
-        <p:txBody>
-          <a:bodyPr/>
+        <p:spPr>
+          <a:xfrm>
+            <a:off x="1464985" y="895452"/>
+            <a:ext cx="4736640" cy="1077229"/>
+          </a:xfrm>
+        </p:spPr>
+        <p:txBody>
+          <a:bodyPr>
+            <a:normAutofit/>
+          </a:bodyPr>
           <a:lstStyle/>
           <a:p>
             <a:pPr algn="ctr"/>
             <a:r>
-              <a:rPr lang="hu-HU" dirty="0" smtClean="0"/>
-              <a:t>Orvos tudomány</a:t>
-            </a:r>
-            <a:endParaRPr lang="hu-HU" dirty="0"/>
-          </a:p>
-        </p:txBody>
-      </p:sp>
-      <p:sp>
-        <p:nvSpPr>
-          <p:cNvPr id="3" name="Tartalom helye 2"/>
-          <p:cNvSpPr>
-            <a:spLocks noGrp="1"/>
-          </p:cNvSpPr>
-          <p:nvPr>
-            <p:ph idx="1"/>
-          </p:nvPr>
-        </p:nvSpPr>
-        <p:spPr/>
-        <p:txBody>
-          <a:bodyPr/>
-          <a:lstStyle/>
-          <a:p>
-            <a:endParaRPr lang="hu-HU"/>
+              <a:rPr lang="hu-HU" sz="4000" dirty="0">
+                <a:latin typeface="Georgia" panose="02040502050405020303" pitchFamily="18" charset="0"/>
+              </a:rPr>
+              <a:t>Járműtechnika</a:t>
+            </a:r>
           </a:p>
         </p:txBody>
       </p:sp>
@@ -4950,13 +5707,263 @@
   <p:clrMapOvr>
     <a:masterClrMapping/>
   </p:clrMapOvr>
-  <p:timing>
-    <p:tnLst>
-      <p:par>
-        <p:cTn id="1" dur="indefinite" restart="never" nodeType="tmRoot"/>
-      </p:par>
-    </p:tnLst>
-  </p:timing>
+</p:sld>
+</file>
+
+<file path=ppt/slides/slide6.xml><?xml version="1.0" encoding="utf-8"?>
+<p:sld xmlns:a="http://schemas.openxmlformats.org/drawingml/2006/main" xmlns:r="http://schemas.openxmlformats.org/officeDocument/2006/relationships" xmlns:p="http://schemas.openxmlformats.org/presentationml/2006/main">
+  <p:cSld>
+    <p:spTree>
+      <p:nvGrpSpPr>
+        <p:cNvPr id="1" name=""/>
+        <p:cNvGrpSpPr/>
+        <p:nvPr/>
+      </p:nvGrpSpPr>
+      <p:grpSpPr>
+        <a:xfrm>
+          <a:off x="0" y="0"/>
+          <a:ext cx="0" cy="0"/>
+          <a:chOff x="0" y="0"/>
+          <a:chExt cx="0" cy="0"/>
+        </a:xfrm>
+      </p:grpSpPr>
+      <p:sp>
+        <p:nvSpPr>
+          <p:cNvPr id="3" name="Tartalom helye 2">
+            <a:extLst>
+              <a:ext uri="{FF2B5EF4-FFF2-40B4-BE49-F238E27FC236}">
+                <a16:creationId xmlns:a16="http://schemas.microsoft.com/office/drawing/2014/main" id="{E52253C6-85F1-E381-1B2C-2AD453549B89}"/>
+              </a:ext>
+            </a:extLst>
+          </p:cNvPr>
+          <p:cNvSpPr>
+            <a:spLocks noGrp="1"/>
+          </p:cNvSpPr>
+          <p:nvPr>
+            <p:ph idx="1"/>
+          </p:nvPr>
+        </p:nvSpPr>
+        <p:spPr>
+          <a:xfrm>
+            <a:off x="2773599" y="2052116"/>
+            <a:ext cx="7248587" cy="3615353"/>
+          </a:xfrm>
+        </p:spPr>
+        <p:txBody>
+          <a:bodyPr/>
+          <a:lstStyle/>
+          <a:p>
+            <a:pPr marL="0" indent="0">
+              <a:buNone/>
+            </a:pPr>
+            <a:r>
+              <a:rPr lang="hu-HU" dirty="0">
+                <a:hlinkClick r:id="rId2"/>
+              </a:rPr>
+              <a:t>https://www.divehardtours.com/japan-utazas-tomegkozlekedes</a:t>
+            </a:r>
+            <a:endParaRPr lang="hu-HU" dirty="0"/>
+          </a:p>
+          <a:p>
+            <a:pPr marL="0" indent="0">
+              <a:buNone/>
+            </a:pPr>
+            <a:r>
+              <a:rPr lang="hu-HU" dirty="0">
+                <a:hlinkClick r:id="rId3"/>
+              </a:rPr>
+              <a:t>https://utazgatok.hu/andras/3846/japan-munka-megszallottsag-technologia-wc/</a:t>
+            </a:r>
+            <a:endParaRPr lang="hu-HU" dirty="0"/>
+          </a:p>
+          <a:p>
+            <a:pPr marL="0" indent="0">
+              <a:buNone/>
+            </a:pPr>
+            <a:r>
+              <a:rPr lang="hu-HU" dirty="0">
+                <a:hlinkClick r:id="rId4"/>
+              </a:rPr>
+              <a:t>https://hu.wikipedia.org/wiki/Jap%C3%A1n</a:t>
+            </a:r>
+            <a:endParaRPr lang="hu-HU" dirty="0"/>
+          </a:p>
+          <a:p>
+            <a:pPr marL="0" indent="0">
+              <a:buNone/>
+            </a:pPr>
+            <a:r>
+              <a:rPr lang="hu-HU" dirty="0">
+                <a:hlinkClick r:id="rId5"/>
+              </a:rPr>
+              <a:t>https://hu.wikipedia.org/wiki/Jap%C3%A1n_robotika</a:t>
+            </a:r>
+            <a:endParaRPr lang="hu-HU" dirty="0"/>
+          </a:p>
+          <a:p>
+            <a:pPr marL="0" indent="0">
+              <a:buNone/>
+            </a:pPr>
+            <a:endParaRPr lang="hu-HU" dirty="0"/>
+          </a:p>
+        </p:txBody>
+      </p:sp>
+      <p:sp>
+        <p:nvSpPr>
+          <p:cNvPr id="4" name="Cím 1">
+            <a:extLst>
+              <a:ext uri="{FF2B5EF4-FFF2-40B4-BE49-F238E27FC236}">
+                <a16:creationId xmlns:a16="http://schemas.microsoft.com/office/drawing/2014/main" id="{08A154F3-A28C-F056-E5EA-81DD2931F709}"/>
+              </a:ext>
+            </a:extLst>
+          </p:cNvPr>
+          <p:cNvSpPr txBox="1">
+            <a:spLocks/>
+          </p:cNvSpPr>
+          <p:nvPr/>
+        </p:nvSpPr>
+        <p:spPr>
+          <a:xfrm>
+            <a:off x="1464985" y="895452"/>
+            <a:ext cx="4736640" cy="1077229"/>
+          </a:xfrm>
+          <a:prstGeom prst="rect">
+            <a:avLst/>
+          </a:prstGeom>
+        </p:spPr>
+        <p:txBody>
+          <a:bodyPr vert="horz" lIns="91440" tIns="45720" rIns="91440" bIns="45720" rtlCol="0" anchor="t">
+            <a:normAutofit/>
+          </a:bodyPr>
+          <a:lstStyle>
+            <a:lvl1pPr algn="r" defTabSz="914400" rtl="0" eaLnBrk="1" latinLnBrk="0" hangingPunct="1">
+              <a:lnSpc>
+                <a:spcPct val="90000"/>
+              </a:lnSpc>
+              <a:spcBef>
+                <a:spcPct val="0"/>
+              </a:spcBef>
+              <a:buNone/>
+              <a:defRPr sz="3400" b="0" i="0" kern="1200" cap="none">
+                <a:solidFill>
+                  <a:schemeClr val="tx1"/>
+                </a:solidFill>
+                <a:effectLst/>
+                <a:latin typeface="+mj-lt"/>
+                <a:ea typeface="+mj-ea"/>
+                <a:cs typeface="+mj-cs"/>
+              </a:defRPr>
+            </a:lvl1pPr>
+          </a:lstStyle>
+          <a:p>
+            <a:pPr algn="ctr"/>
+            <a:r>
+              <a:rPr lang="hu-HU" sz="4000" dirty="0">
+                <a:latin typeface="Georgia" panose="02040502050405020303" pitchFamily="18" charset="0"/>
+              </a:rPr>
+              <a:t>Források:</a:t>
+            </a:r>
+          </a:p>
+        </p:txBody>
+      </p:sp>
+    </p:spTree>
+    <p:extLst>
+      <p:ext uri="{BB962C8B-B14F-4D97-AF65-F5344CB8AC3E}">
+        <p14:creationId xmlns:p14="http://schemas.microsoft.com/office/powerpoint/2010/main" val="1826703876"/>
+      </p:ext>
+    </p:extLst>
+  </p:cSld>
+  <p:clrMapOvr>
+    <a:masterClrMapping/>
+  </p:clrMapOvr>
+</p:sld>
+</file>
+
+<file path=ppt/slides/slide7.xml><?xml version="1.0" encoding="utf-8"?>
+<p:sld xmlns:a="http://schemas.openxmlformats.org/drawingml/2006/main" xmlns:r="http://schemas.openxmlformats.org/officeDocument/2006/relationships" xmlns:p="http://schemas.openxmlformats.org/presentationml/2006/main">
+  <p:cSld>
+    <p:spTree>
+      <p:nvGrpSpPr>
+        <p:cNvPr id="1" name=""/>
+        <p:cNvGrpSpPr/>
+        <p:nvPr/>
+      </p:nvGrpSpPr>
+      <p:grpSpPr>
+        <a:xfrm>
+          <a:off x="0" y="0"/>
+          <a:ext cx="0" cy="0"/>
+          <a:chOff x="0" y="0"/>
+          <a:chExt cx="0" cy="0"/>
+        </a:xfrm>
+      </p:grpSpPr>
+      <p:sp>
+        <p:nvSpPr>
+          <p:cNvPr id="4" name="Cím 1">
+            <a:extLst>
+              <a:ext uri="{FF2B5EF4-FFF2-40B4-BE49-F238E27FC236}">
+                <a16:creationId xmlns:a16="http://schemas.microsoft.com/office/drawing/2014/main" id="{D3D449B6-C58F-A2DE-812F-A85573857D61}"/>
+              </a:ext>
+            </a:extLst>
+          </p:cNvPr>
+          <p:cNvSpPr txBox="1">
+            <a:spLocks/>
+          </p:cNvSpPr>
+          <p:nvPr/>
+        </p:nvSpPr>
+        <p:spPr>
+          <a:xfrm>
+            <a:off x="3026037" y="2708829"/>
+            <a:ext cx="6139926" cy="1440342"/>
+          </a:xfrm>
+          <a:prstGeom prst="rect">
+            <a:avLst/>
+          </a:prstGeom>
+        </p:spPr>
+        <p:txBody>
+          <a:bodyPr vert="horz" lIns="91440" tIns="45720" rIns="91440" bIns="45720" rtlCol="0" anchor="t">
+            <a:normAutofit fontScale="92500" lnSpcReduction="20000"/>
+          </a:bodyPr>
+          <a:lstStyle>
+            <a:lvl1pPr algn="r" defTabSz="914400" rtl="0" eaLnBrk="1" latinLnBrk="0" hangingPunct="1">
+              <a:lnSpc>
+                <a:spcPct val="90000"/>
+              </a:lnSpc>
+              <a:spcBef>
+                <a:spcPct val="0"/>
+              </a:spcBef>
+              <a:buNone/>
+              <a:defRPr sz="3400" b="0" i="0" kern="1200" cap="none">
+                <a:solidFill>
+                  <a:schemeClr val="tx1"/>
+                </a:solidFill>
+                <a:effectLst/>
+                <a:latin typeface="+mj-lt"/>
+                <a:ea typeface="+mj-ea"/>
+                <a:cs typeface="+mj-cs"/>
+              </a:defRPr>
+            </a:lvl1pPr>
+          </a:lstStyle>
+          <a:p>
+            <a:pPr algn="ctr"/>
+            <a:r>
+              <a:rPr lang="hu-HU" sz="6000" dirty="0">
+                <a:latin typeface="Georgia" panose="02040502050405020303" pitchFamily="18" charset="0"/>
+              </a:rPr>
+              <a:t>Köszönöm a figyelmet!</a:t>
+            </a:r>
+          </a:p>
+        </p:txBody>
+      </p:sp>
+    </p:spTree>
+    <p:extLst>
+      <p:ext uri="{BB962C8B-B14F-4D97-AF65-F5344CB8AC3E}">
+        <p14:creationId xmlns:p14="http://schemas.microsoft.com/office/powerpoint/2010/main" val="2238096572"/>
+      </p:ext>
+    </p:extLst>
+  </p:cSld>
+  <p:clrMapOvr>
+    <a:masterClrMapping/>
+  </p:clrMapOvr>
 </p:sld>
 </file>
 

</xml_diff>